<commit_message>
New update with multicoluns
</commit_message>
<xml_diff>
--- a/doc/tex/sdf/tq_76558_cow_protocol/figures_raw/Full2.pptx
+++ b/doc/tex/sdf/tq_76558_cow_protocol/figures_raw/Full2.pptx
@@ -8,11 +8,12 @@
     <p:sldId id="256" r:id="rId2"/>
     <p:sldId id="262" r:id="rId3"/>
     <p:sldId id="258" r:id="rId4"/>
-    <p:sldId id="257" r:id="rId5"/>
-    <p:sldId id="259" r:id="rId6"/>
-    <p:sldId id="260" r:id="rId7"/>
-    <p:sldId id="261" r:id="rId8"/>
+    <p:sldId id="265" r:id="rId5"/>
+    <p:sldId id="257" r:id="rId6"/>
+    <p:sldId id="261" r:id="rId7"/>
+    <p:sldId id="266" r:id="rId8"/>
     <p:sldId id="263" r:id="rId9"/>
+    <p:sldId id="264" r:id="rId10"/>
   </p:sldIdLst>
   <p:sldSz cx="12192000" cy="6858000"/>
   <p:notesSz cx="6858000" cy="9144000"/>
@@ -268,7 +269,7 @@
           <a:p>
             <a:fld id="{B8F5C3C8-5F51-4191-BFCC-D40874AC55AA}" type="datetimeFigureOut">
               <a:rPr lang="en-GB" smtClean="0"/>
-              <a:t>30/10/2018</a:t>
+              <a:t>09/11/2018</a:t>
             </a:fld>
             <a:endParaRPr lang="en-GB"/>
           </a:p>
@@ -468,7 +469,7 @@
           <a:p>
             <a:fld id="{B8F5C3C8-5F51-4191-BFCC-D40874AC55AA}" type="datetimeFigureOut">
               <a:rPr lang="en-GB" smtClean="0"/>
-              <a:t>30/10/2018</a:t>
+              <a:t>09/11/2018</a:t>
             </a:fld>
             <a:endParaRPr lang="en-GB"/>
           </a:p>
@@ -678,7 +679,7 @@
           <a:p>
             <a:fld id="{B8F5C3C8-5F51-4191-BFCC-D40874AC55AA}" type="datetimeFigureOut">
               <a:rPr lang="en-GB" smtClean="0"/>
-              <a:t>30/10/2018</a:t>
+              <a:t>09/11/2018</a:t>
             </a:fld>
             <a:endParaRPr lang="en-GB"/>
           </a:p>
@@ -878,7 +879,7 @@
           <a:p>
             <a:fld id="{B8F5C3C8-5F51-4191-BFCC-D40874AC55AA}" type="datetimeFigureOut">
               <a:rPr lang="en-GB" smtClean="0"/>
-              <a:t>30/10/2018</a:t>
+              <a:t>09/11/2018</a:t>
             </a:fld>
             <a:endParaRPr lang="en-GB"/>
           </a:p>
@@ -1154,7 +1155,7 @@
           <a:p>
             <a:fld id="{B8F5C3C8-5F51-4191-BFCC-D40874AC55AA}" type="datetimeFigureOut">
               <a:rPr lang="en-GB" smtClean="0"/>
-              <a:t>30/10/2018</a:t>
+              <a:t>09/11/2018</a:t>
             </a:fld>
             <a:endParaRPr lang="en-GB"/>
           </a:p>
@@ -1422,7 +1423,7 @@
           <a:p>
             <a:fld id="{B8F5C3C8-5F51-4191-BFCC-D40874AC55AA}" type="datetimeFigureOut">
               <a:rPr lang="en-GB" smtClean="0"/>
-              <a:t>30/10/2018</a:t>
+              <a:t>09/11/2018</a:t>
             </a:fld>
             <a:endParaRPr lang="en-GB"/>
           </a:p>
@@ -1837,7 +1838,7 @@
           <a:p>
             <a:fld id="{B8F5C3C8-5F51-4191-BFCC-D40874AC55AA}" type="datetimeFigureOut">
               <a:rPr lang="en-GB" smtClean="0"/>
-              <a:t>30/10/2018</a:t>
+              <a:t>09/11/2018</a:t>
             </a:fld>
             <a:endParaRPr lang="en-GB"/>
           </a:p>
@@ -1979,7 +1980,7 @@
           <a:p>
             <a:fld id="{B8F5C3C8-5F51-4191-BFCC-D40874AC55AA}" type="datetimeFigureOut">
               <a:rPr lang="en-GB" smtClean="0"/>
-              <a:t>30/10/2018</a:t>
+              <a:t>09/11/2018</a:t>
             </a:fld>
             <a:endParaRPr lang="en-GB"/>
           </a:p>
@@ -2092,7 +2093,7 @@
           <a:p>
             <a:fld id="{B8F5C3C8-5F51-4191-BFCC-D40874AC55AA}" type="datetimeFigureOut">
               <a:rPr lang="en-GB" smtClean="0"/>
-              <a:t>30/10/2018</a:t>
+              <a:t>09/11/2018</a:t>
             </a:fld>
             <a:endParaRPr lang="en-GB"/>
           </a:p>
@@ -2405,7 +2406,7 @@
           <a:p>
             <a:fld id="{B8F5C3C8-5F51-4191-BFCC-D40874AC55AA}" type="datetimeFigureOut">
               <a:rPr lang="en-GB" smtClean="0"/>
-              <a:t>30/10/2018</a:t>
+              <a:t>09/11/2018</a:t>
             </a:fld>
             <a:endParaRPr lang="en-GB"/>
           </a:p>
@@ -2694,7 +2695,7 @@
           <a:p>
             <a:fld id="{B8F5C3C8-5F51-4191-BFCC-D40874AC55AA}" type="datetimeFigureOut">
               <a:rPr lang="en-GB" smtClean="0"/>
-              <a:t>30/10/2018</a:t>
+              <a:t>09/11/2018</a:t>
             </a:fld>
             <a:endParaRPr lang="en-GB"/>
           </a:p>
@@ -2942,7 +2943,7 @@
           <a:p>
             <a:fld id="{B8F5C3C8-5F51-4191-BFCC-D40874AC55AA}" type="datetimeFigureOut">
               <a:rPr lang="en-GB" smtClean="0"/>
-              <a:t>30/10/2018</a:t>
+              <a:t>09/11/2018</a:t>
             </a:fld>
             <a:endParaRPr lang="en-GB"/>
           </a:p>
@@ -6015,8 +6016,8 @@
         </p:nvGrpSpPr>
         <p:grpSpPr>
           <a:xfrm>
-            <a:off x="2095500" y="75531"/>
-            <a:ext cx="7848600" cy="6630069"/>
+            <a:off x="3130550" y="113966"/>
+            <a:ext cx="5930900" cy="6630069"/>
             <a:chOff x="3657600" y="1022404"/>
             <a:chExt cx="5852023" cy="5751697"/>
           </a:xfrm>
@@ -6114,7 +6115,7 @@
                     <am3d:raster rName="Office3DRenderer" rVer="16.0.8326">
                       <am3d:blip r:embed="rId3"/>
                     </am3d:raster>
-                    <am3d:objViewport viewportSz="909792"/>
+                    <am3d:objViewport viewportSz="799899"/>
                     <am3d:ambientLight>
                       <am3d:clr>
                         <a:scrgbClr r="50000" g="50000" b="50000"/>
@@ -6308,7 +6309,7 @@
                       <am3d:raster rName="Office3DRenderer" rVer="16.0.8326">
                         <am3d:blip r:embed="rId6"/>
                       </am3d:raster>
-                      <am3d:objViewport viewportSz="1854853"/>
+                      <am3d:objViewport viewportSz="1637673"/>
                       <am3d:ambientLight>
                         <am3d:clr>
                           <a:scrgbClr r="50000" g="50000" b="50000"/>
@@ -6793,7 +6794,7 @@
                       <am3d:raster rName="Office3DRenderer" rVer="16.0.8326">
                         <am3d:blip r:embed="rId6"/>
                       </am3d:raster>
-                      <am3d:objViewport viewportSz="1854853"/>
+                      <am3d:objViewport viewportSz="1637673"/>
                       <am3d:ambientLight>
                         <am3d:clr>
                           <a:scrgbClr r="50000" g="50000" b="50000"/>
@@ -7017,7 +7018,7 @@
                       <am3d:raster rName="Office3DRenderer" rVer="16.0.8326">
                         <am3d:blip r:embed="rId6"/>
                       </am3d:raster>
-                      <am3d:objViewport viewportSz="1854853"/>
+                      <am3d:objViewport viewportSz="1637673"/>
                       <am3d:ambientLight>
                         <am3d:clr>
                           <a:scrgbClr r="50000" g="50000" b="50000"/>
@@ -7220,6 +7221,66 @@
 </file>
 
 <file path=ppt/slides/slide4.xml><?xml version="1.0" encoding="utf-8"?>
+<p:sld xmlns:a="http://schemas.openxmlformats.org/drawingml/2006/main" xmlns:r="http://schemas.openxmlformats.org/officeDocument/2006/relationships" xmlns:p="http://schemas.openxmlformats.org/presentationml/2006/main">
+  <p:cSld>
+    <p:spTree>
+      <p:nvGrpSpPr>
+        <p:cNvPr id="1" name=""/>
+        <p:cNvGrpSpPr/>
+        <p:nvPr/>
+      </p:nvGrpSpPr>
+      <p:grpSpPr>
+        <a:xfrm>
+          <a:off x="0" y="0"/>
+          <a:ext cx="0" cy="0"/>
+          <a:chOff x="0" y="0"/>
+          <a:chExt cx="0" cy="0"/>
+        </a:xfrm>
+      </p:grpSpPr>
+      <p:pic>
+        <p:nvPicPr>
+          <p:cNvPr id="2" name="Imagem 1">
+            <a:extLst>
+              <a:ext uri="{FF2B5EF4-FFF2-40B4-BE49-F238E27FC236}">
+                <a16:creationId xmlns:a16="http://schemas.microsoft.com/office/drawing/2014/main" id="{2A823950-02F6-4F6D-9A58-E0C19DFB6223}"/>
+              </a:ext>
+            </a:extLst>
+          </p:cNvPr>
+          <p:cNvPicPr>
+            <a:picLocks noChangeAspect="1"/>
+          </p:cNvPicPr>
+          <p:nvPr/>
+        </p:nvPicPr>
+        <p:blipFill>
+          <a:blip r:embed="rId2"/>
+          <a:stretch>
+            <a:fillRect/>
+          </a:stretch>
+        </p:blipFill>
+        <p:spPr>
+          <a:xfrm>
+            <a:off x="2818296" y="0"/>
+            <a:ext cx="6555408" cy="6858000"/>
+          </a:xfrm>
+          <a:prstGeom prst="rect">
+            <a:avLst/>
+          </a:prstGeom>
+        </p:spPr>
+      </p:pic>
+    </p:spTree>
+    <p:extLst>
+      <p:ext uri="{BB962C8B-B14F-4D97-AF65-F5344CB8AC3E}">
+        <p14:creationId xmlns:p14="http://schemas.microsoft.com/office/powerpoint/2010/main" val="1264789361"/>
+      </p:ext>
+    </p:extLst>
+  </p:cSld>
+  <p:clrMapOvr>
+    <a:masterClrMapping/>
+  </p:clrMapOvr>
+</p:sld>
+</file>
+
+<file path=ppt/slides/slide5.xml><?xml version="1.0" encoding="utf-8"?>
 <p:sld xmlns:a="http://schemas.openxmlformats.org/drawingml/2006/main" xmlns:r="http://schemas.openxmlformats.org/officeDocument/2006/relationships" xmlns:p="http://schemas.openxmlformats.org/presentationml/2006/main">
   <p:cSld>
     <p:spTree>
@@ -7893,66 +7954,6 @@
 </p:sld>
 </file>
 
-<file path=ppt/slides/slide5.xml><?xml version="1.0" encoding="utf-8"?>
-<p:sld xmlns:a="http://schemas.openxmlformats.org/drawingml/2006/main" xmlns:r="http://schemas.openxmlformats.org/officeDocument/2006/relationships" xmlns:p="http://schemas.openxmlformats.org/presentationml/2006/main">
-  <p:cSld>
-    <p:spTree>
-      <p:nvGrpSpPr>
-        <p:cNvPr id="1" name=""/>
-        <p:cNvGrpSpPr/>
-        <p:nvPr/>
-      </p:nvGrpSpPr>
-      <p:grpSpPr>
-        <a:xfrm>
-          <a:off x="0" y="0"/>
-          <a:ext cx="0" cy="0"/>
-          <a:chOff x="0" y="0"/>
-          <a:chExt cx="0" cy="0"/>
-        </a:xfrm>
-      </p:grpSpPr>
-      <p:pic>
-        <p:nvPicPr>
-          <p:cNvPr id="2" name="Imagem 1">
-            <a:extLst>
-              <a:ext uri="{FF2B5EF4-FFF2-40B4-BE49-F238E27FC236}">
-                <a16:creationId xmlns:a16="http://schemas.microsoft.com/office/drawing/2014/main" id="{61C84890-14B0-41C0-A1B6-B9E59A4013EB}"/>
-              </a:ext>
-            </a:extLst>
-          </p:cNvPr>
-          <p:cNvPicPr>
-            <a:picLocks noChangeAspect="1"/>
-          </p:cNvPicPr>
-          <p:nvPr/>
-        </p:nvPicPr>
-        <p:blipFill>
-          <a:blip r:embed="rId2"/>
-          <a:stretch>
-            <a:fillRect/>
-          </a:stretch>
-        </p:blipFill>
-        <p:spPr>
-          <a:xfrm>
-            <a:off x="-1364474" y="1663252"/>
-            <a:ext cx="14920948" cy="3531497"/>
-          </a:xfrm>
-          <a:prstGeom prst="rect">
-            <a:avLst/>
-          </a:prstGeom>
-        </p:spPr>
-      </p:pic>
-    </p:spTree>
-    <p:extLst>
-      <p:ext uri="{BB962C8B-B14F-4D97-AF65-F5344CB8AC3E}">
-        <p14:creationId xmlns:p14="http://schemas.microsoft.com/office/powerpoint/2010/main" val="4117038832"/>
-      </p:ext>
-    </p:extLst>
-  </p:cSld>
-  <p:clrMapOvr>
-    <a:masterClrMapping/>
-  </p:clrMapOvr>
-</p:sld>
-</file>
-
 <file path=ppt/slides/slide6.xml><?xml version="1.0" encoding="utf-8"?>
 <p:sld xmlns:a="http://schemas.openxmlformats.org/drawingml/2006/main" xmlns:r="http://schemas.openxmlformats.org/officeDocument/2006/relationships" xmlns:p="http://schemas.openxmlformats.org/presentationml/2006/main">
   <p:cSld>
@@ -7972,10 +7973,10 @@
       </p:grpSpPr>
       <p:pic>
         <p:nvPicPr>
-          <p:cNvPr id="2" name="Imagem 1">
+          <p:cNvPr id="3" name="Imagem 2">
             <a:extLst>
               <a:ext uri="{FF2B5EF4-FFF2-40B4-BE49-F238E27FC236}">
-                <a16:creationId xmlns:a16="http://schemas.microsoft.com/office/drawing/2014/main" id="{2C9D64A0-E71D-4259-9675-689E27B0711B}"/>
+                <a16:creationId xmlns:a16="http://schemas.microsoft.com/office/drawing/2014/main" id="{5DB5B8DF-EE8B-452A-A3CB-5C886C5AC525}"/>
               </a:ext>
             </a:extLst>
           </p:cNvPr>
@@ -7992,8 +7993,8 @@
         </p:blipFill>
         <p:spPr>
           <a:xfrm>
-            <a:off x="-1347208" y="1462059"/>
-            <a:ext cx="14886416" cy="3933883"/>
+            <a:off x="-1238250" y="1618137"/>
+            <a:ext cx="14668500" cy="3445710"/>
           </a:xfrm>
           <a:prstGeom prst="rect">
             <a:avLst/>
@@ -8003,7 +8004,7 @@
     </p:spTree>
     <p:extLst>
       <p:ext uri="{BB962C8B-B14F-4D97-AF65-F5344CB8AC3E}">
-        <p14:creationId xmlns:p14="http://schemas.microsoft.com/office/powerpoint/2010/main" val="2529293038"/>
+        <p14:creationId xmlns:p14="http://schemas.microsoft.com/office/powerpoint/2010/main" val="2004065918"/>
       </p:ext>
     </p:extLst>
   </p:cSld>
@@ -8035,7 +8036,7 @@
           <p:cNvPr id="2" name="Imagem 1">
             <a:extLst>
               <a:ext uri="{FF2B5EF4-FFF2-40B4-BE49-F238E27FC236}">
-                <a16:creationId xmlns:a16="http://schemas.microsoft.com/office/drawing/2014/main" id="{283E0B62-844B-40EF-ABBF-A1071DC4CF88}"/>
+                <a16:creationId xmlns:a16="http://schemas.microsoft.com/office/drawing/2014/main" id="{428762CD-2C30-496C-A700-B558BDDA3079}"/>
               </a:ext>
             </a:extLst>
           </p:cNvPr>
@@ -8052,8 +8053,8 @@
         </p:blipFill>
         <p:spPr>
           <a:xfrm>
-            <a:off x="-1405188" y="1666930"/>
-            <a:ext cx="15002376" cy="3524140"/>
+            <a:off x="3789251" y="-407914"/>
+            <a:ext cx="4613498" cy="8136000"/>
           </a:xfrm>
           <a:prstGeom prst="rect">
             <a:avLst/>
@@ -8063,7 +8064,7 @@
     </p:spTree>
     <p:extLst>
       <p:ext uri="{BB962C8B-B14F-4D97-AF65-F5344CB8AC3E}">
-        <p14:creationId xmlns:p14="http://schemas.microsoft.com/office/powerpoint/2010/main" val="2004065918"/>
+        <p14:creationId xmlns:p14="http://schemas.microsoft.com/office/powerpoint/2010/main" val="2908411378"/>
       </p:ext>
     </p:extLst>
   </p:cSld>
@@ -8231,7 +8232,7 @@
                     <am3d:spPr>
                       <a:xfrm>
                         <a:off x="0" y="0"/>
-                        <a:ext cx="315403" cy="437358"/>
+                        <a:ext cx="503965" cy="669954"/>
                       </a:xfrm>
                       <a:prstGeom prst="rect">
                         <a:avLst/>
@@ -8429,7 +8430,7 @@
                       <am3d:spPr>
                         <a:xfrm rot="5400000">
                           <a:off x="0" y="0"/>
-                          <a:ext cx="769446" cy="502410"/>
+                          <a:ext cx="1178652" cy="802772"/>
                         </a:xfrm>
                         <a:prstGeom prst="rect">
                           <a:avLst/>
@@ -8918,7 +8919,7 @@
                       <am3d:spPr>
                         <a:xfrm rot="5400000">
                           <a:off x="0" y="0"/>
-                          <a:ext cx="769446" cy="502410"/>
+                          <a:ext cx="1178652" cy="802772"/>
                         </a:xfrm>
                         <a:prstGeom prst="rect">
                           <a:avLst/>
@@ -9146,7 +9147,7 @@
                       <am3d:spPr>
                         <a:xfrm rot="5400000">
                           <a:off x="0" y="0"/>
-                          <a:ext cx="769446" cy="502410"/>
+                          <a:ext cx="1178652" cy="802772"/>
                         </a:xfrm>
                         <a:prstGeom prst="rect">
                           <a:avLst/>
@@ -10047,8 +10048,8 @@
           </a:fontRef>
         </p:style>
       </p:cxnSp>
-      <mc:AlternateContent xmlns:mc="http://schemas.openxmlformats.org/markup-compatibility/2006">
-        <mc:Choice xmlns:am3d="http://schemas.microsoft.com/office/drawing/2017/model3d" Requires="am3d">
+      <mc:AlternateContent xmlns:mc="http://schemas.openxmlformats.org/markup-compatibility/2006" xmlns:am3d="http://schemas.microsoft.com/office/drawing/2017/model3d">
+        <mc:Choice Requires="am3d">
           <p:graphicFrame>
             <p:nvGraphicFramePr>
               <p:cNvPr id="37" name="Modelo 3D 36" descr="Cubo Cinza-Claro">
@@ -10139,7 +10140,7 @@
             </a:graphic>
           </p:graphicFrame>
         </mc:Choice>
-        <mc:Fallback>
+        <mc:Fallback xmlns="">
           <p:pic>
             <p:nvPicPr>
               <p:cNvPr id="37" name="Modelo 3D 36" descr="Cubo Cinza-Claro">
@@ -10155,7 +10156,7 @@
               <p:nvPr/>
             </p:nvPicPr>
             <p:blipFill>
-              <a:blip r:embed="rId18"/>
+              <a:blip r:embed="rId19"/>
               <a:stretch>
                 <a:fillRect/>
               </a:stretch>
@@ -10192,8 +10193,8 @@
             <a:chExt cx="976368" cy="1108906"/>
           </a:xfrm>
         </p:grpSpPr>
-        <mc:AlternateContent xmlns:mc="http://schemas.openxmlformats.org/markup-compatibility/2006">
-          <mc:Choice xmlns:am3d="http://schemas.microsoft.com/office/drawing/2017/model3d" Requires="am3d">
+        <mc:AlternateContent xmlns:mc="http://schemas.openxmlformats.org/markup-compatibility/2006" xmlns:am3d="http://schemas.microsoft.com/office/drawing/2017/model3d">
+          <mc:Choice Requires="am3d">
             <p:graphicFrame>
               <p:nvGraphicFramePr>
                 <p:cNvPr id="39" name="Modelo 3D 38" descr="Hemisfério Cinza-Claro">
@@ -10220,7 +10221,7 @@
               </p:xfrm>
               <a:graphic>
                 <a:graphicData uri="http://schemas.microsoft.com/office/drawing/2017/model3d">
-                  <am3d:model3d r:embed="rId19">
+                  <am3d:model3d r:embed="rId20">
                     <am3d:spPr>
                       <a:xfrm rot="10800000">
                         <a:off x="0" y="0"/>
@@ -10247,9 +10248,9 @@
                       <am3d:rot ax="-1200001"/>
                       <am3d:postTrans dx="0" dy="0" dz="0"/>
                     </am3d:trans>
-                    <am3d:attrSrcUrl r:id="rId20"/>
+                    <am3d:attrSrcUrl r:id="rId21"/>
                     <am3d:raster rName="Office3DRenderer" rVer="16.0.8326">
-                      <am3d:blip r:embed="rId21"/>
+                      <am3d:blip r:embed="rId22"/>
                     </am3d:raster>
                     <am3d:objViewport viewportSz="1218773"/>
                     <am3d:ambientLight>
@@ -10284,7 +10285,7 @@
               </a:graphic>
             </p:graphicFrame>
           </mc:Choice>
-          <mc:Fallback>
+          <mc:Fallback xmlns="">
             <p:pic>
               <p:nvPicPr>
                 <p:cNvPr id="39" name="Modelo 3D 38" descr="Hemisfério Cinza-Claro">
@@ -10300,7 +10301,7 @@
                 <p:nvPr/>
               </p:nvPicPr>
               <p:blipFill>
-                <a:blip r:embed="rId21"/>
+                <a:blip r:embed="rId23"/>
                 <a:stretch>
                   <a:fillRect/>
                 </a:stretch>
@@ -10541,8 +10542,8 @@
             <a:chExt cx="1166803" cy="918471"/>
           </a:xfrm>
         </p:grpSpPr>
-        <mc:AlternateContent xmlns:mc="http://schemas.openxmlformats.org/markup-compatibility/2006">
-          <mc:Choice xmlns:am3d="http://schemas.microsoft.com/office/drawing/2017/model3d" Requires="am3d">
+        <mc:AlternateContent xmlns:mc="http://schemas.openxmlformats.org/markup-compatibility/2006" xmlns:am3d="http://schemas.microsoft.com/office/drawing/2017/model3d">
+          <mc:Choice Requires="am3d">
             <p:graphicFrame>
               <p:nvGraphicFramePr>
                 <p:cNvPr id="61" name="Modelo 3D 60" descr="Hemisfério Cinza-Claro">
@@ -10569,7 +10570,7 @@
               </p:xfrm>
               <a:graphic>
                 <a:graphicData uri="http://schemas.microsoft.com/office/drawing/2017/model3d">
-                  <am3d:model3d r:embed="rId19">
+                  <am3d:model3d r:embed="rId20">
                     <am3d:spPr>
                       <a:xfrm rot="5400000">
                         <a:off x="0" y="0"/>
@@ -10596,9 +10597,9 @@
                       <am3d:rot ax="-1200001"/>
                       <am3d:postTrans dx="0" dy="0" dz="0"/>
                     </am3d:trans>
-                    <am3d:attrSrcUrl r:id="rId20"/>
+                    <am3d:attrSrcUrl r:id="rId21"/>
                     <am3d:raster rName="Office3DRenderer" rVer="16.0.8326">
-                      <am3d:blip r:embed="rId21"/>
+                      <am3d:blip r:embed="rId23"/>
                     </am3d:raster>
                     <am3d:objViewport viewportSz="1218773"/>
                     <am3d:ambientLight>
@@ -10633,7 +10634,7 @@
               </a:graphic>
             </p:graphicFrame>
           </mc:Choice>
-          <mc:Fallback>
+          <mc:Fallback xmlns="">
             <p:pic>
               <p:nvPicPr>
                 <p:cNvPr id="61" name="Modelo 3D 60" descr="Hemisfério Cinza-Claro">
@@ -10649,7 +10650,7 @@
                 <p:nvPr/>
               </p:nvPicPr>
               <p:blipFill>
-                <a:blip r:embed="rId21"/>
+                <a:blip r:embed="rId23"/>
                 <a:stretch>
                   <a:fillRect/>
                 </a:stretch>
@@ -10710,6 +10711,66 @@
     <p:extLst>
       <p:ext uri="{BB962C8B-B14F-4D97-AF65-F5344CB8AC3E}">
         <p14:creationId xmlns:p14="http://schemas.microsoft.com/office/powerpoint/2010/main" val="1703294545"/>
+      </p:ext>
+    </p:extLst>
+  </p:cSld>
+  <p:clrMapOvr>
+    <a:masterClrMapping/>
+  </p:clrMapOvr>
+</p:sld>
+</file>
+
+<file path=ppt/slides/slide9.xml><?xml version="1.0" encoding="utf-8"?>
+<p:sld xmlns:a="http://schemas.openxmlformats.org/drawingml/2006/main" xmlns:r="http://schemas.openxmlformats.org/officeDocument/2006/relationships" xmlns:p="http://schemas.openxmlformats.org/presentationml/2006/main">
+  <p:cSld>
+    <p:spTree>
+      <p:nvGrpSpPr>
+        <p:cNvPr id="1" name=""/>
+        <p:cNvGrpSpPr/>
+        <p:nvPr/>
+      </p:nvGrpSpPr>
+      <p:grpSpPr>
+        <a:xfrm>
+          <a:off x="0" y="0"/>
+          <a:ext cx="0" cy="0"/>
+          <a:chOff x="0" y="0"/>
+          <a:chExt cx="0" cy="0"/>
+        </a:xfrm>
+      </p:grpSpPr>
+      <p:pic>
+        <p:nvPicPr>
+          <p:cNvPr id="5" name="Imagem 4">
+            <a:extLst>
+              <a:ext uri="{FF2B5EF4-FFF2-40B4-BE49-F238E27FC236}">
+                <a16:creationId xmlns:a16="http://schemas.microsoft.com/office/drawing/2014/main" id="{0771AF17-4C9F-4230-8F9A-1CE42ECB9DA8}"/>
+              </a:ext>
+            </a:extLst>
+          </p:cNvPr>
+          <p:cNvPicPr>
+            <a:picLocks noChangeAspect="1"/>
+          </p:cNvPicPr>
+          <p:nvPr/>
+        </p:nvPicPr>
+        <p:blipFill>
+          <a:blip r:embed="rId2"/>
+          <a:stretch>
+            <a:fillRect/>
+          </a:stretch>
+        </p:blipFill>
+        <p:spPr>
+          <a:xfrm>
+            <a:off x="-722700" y="-107750"/>
+            <a:ext cx="13637401" cy="7073501"/>
+          </a:xfrm>
+          <a:prstGeom prst="rect">
+            <a:avLst/>
+          </a:prstGeom>
+        </p:spPr>
+      </p:pic>
+    </p:spTree>
+    <p:extLst>
+      <p:ext uri="{BB962C8B-B14F-4D97-AF65-F5344CB8AC3E}">
+        <p14:creationId xmlns:p14="http://schemas.microsoft.com/office/powerpoint/2010/main" val="1924633687"/>
       </p:ext>
     </p:extLst>
   </p:cSld>

</xml_diff>

<commit_message>
The most recent update with IR attack comented
</commit_message>
<xml_diff>
--- a/doc/tex/sdf/tq_76558_cow_protocol/figures_raw/Full2.pptx
+++ b/doc/tex/sdf/tq_76558_cow_protocol/figures_raw/Full2.pptx
@@ -8045,16 +8045,44 @@
           </p:cNvPicPr>
           <p:nvPr/>
         </p:nvPicPr>
-        <p:blipFill>
+        <p:blipFill rotWithShape="1">
           <a:blip r:embed="rId2"/>
-          <a:stretch>
-            <a:fillRect/>
-          </a:stretch>
+          <a:srcRect b="40196"/>
+          <a:stretch/>
         </p:blipFill>
         <p:spPr>
           <a:xfrm>
             <a:off x="3789251" y="-407914"/>
-            <a:ext cx="4613498" cy="8136000"/>
+            <a:ext cx="4613498" cy="4865614"/>
+          </a:xfrm>
+          <a:prstGeom prst="rect">
+            <a:avLst/>
+          </a:prstGeom>
+        </p:spPr>
+      </p:pic>
+      <p:pic>
+        <p:nvPicPr>
+          <p:cNvPr id="3" name="Imagem 2">
+            <a:extLst>
+              <a:ext uri="{FF2B5EF4-FFF2-40B4-BE49-F238E27FC236}">
+                <a16:creationId xmlns:a16="http://schemas.microsoft.com/office/drawing/2014/main" id="{296EBE1C-F117-419E-BBE0-CD531A432B2E}"/>
+              </a:ext>
+            </a:extLst>
+          </p:cNvPr>
+          <p:cNvPicPr>
+            <a:picLocks noChangeAspect="1"/>
+          </p:cNvPicPr>
+          <p:nvPr/>
+        </p:nvPicPr>
+        <p:blipFill rotWithShape="1">
+          <a:blip r:embed="rId2"/>
+          <a:srcRect t="64667"/>
+          <a:stretch/>
+        </p:blipFill>
+        <p:spPr>
+          <a:xfrm>
+            <a:off x="3789251" y="4853354"/>
+            <a:ext cx="4613498" cy="2874732"/>
           </a:xfrm>
           <a:prstGeom prst="rect">
             <a:avLst/>

</xml_diff>

<commit_message>
After meeting update 2
</commit_message>
<xml_diff>
--- a/doc/tex/sdf/tq_76558_cow_protocol/figures_raw/Full2.pptx
+++ b/doc/tex/sdf/tq_76558_cow_protocol/figures_raw/Full2.pptx
@@ -269,7 +269,7 @@
           <a:p>
             <a:fld id="{B8F5C3C8-5F51-4191-BFCC-D40874AC55AA}" type="datetimeFigureOut">
               <a:rPr lang="en-GB" smtClean="0"/>
-              <a:t>09/11/2018</a:t>
+              <a:t>19/11/2018</a:t>
             </a:fld>
             <a:endParaRPr lang="en-GB"/>
           </a:p>
@@ -469,7 +469,7 @@
           <a:p>
             <a:fld id="{B8F5C3C8-5F51-4191-BFCC-D40874AC55AA}" type="datetimeFigureOut">
               <a:rPr lang="en-GB" smtClean="0"/>
-              <a:t>09/11/2018</a:t>
+              <a:t>19/11/2018</a:t>
             </a:fld>
             <a:endParaRPr lang="en-GB"/>
           </a:p>
@@ -679,7 +679,7 @@
           <a:p>
             <a:fld id="{B8F5C3C8-5F51-4191-BFCC-D40874AC55AA}" type="datetimeFigureOut">
               <a:rPr lang="en-GB" smtClean="0"/>
-              <a:t>09/11/2018</a:t>
+              <a:t>19/11/2018</a:t>
             </a:fld>
             <a:endParaRPr lang="en-GB"/>
           </a:p>
@@ -879,7 +879,7 @@
           <a:p>
             <a:fld id="{B8F5C3C8-5F51-4191-BFCC-D40874AC55AA}" type="datetimeFigureOut">
               <a:rPr lang="en-GB" smtClean="0"/>
-              <a:t>09/11/2018</a:t>
+              <a:t>19/11/2018</a:t>
             </a:fld>
             <a:endParaRPr lang="en-GB"/>
           </a:p>
@@ -1155,7 +1155,7 @@
           <a:p>
             <a:fld id="{B8F5C3C8-5F51-4191-BFCC-D40874AC55AA}" type="datetimeFigureOut">
               <a:rPr lang="en-GB" smtClean="0"/>
-              <a:t>09/11/2018</a:t>
+              <a:t>19/11/2018</a:t>
             </a:fld>
             <a:endParaRPr lang="en-GB"/>
           </a:p>
@@ -1423,7 +1423,7 @@
           <a:p>
             <a:fld id="{B8F5C3C8-5F51-4191-BFCC-D40874AC55AA}" type="datetimeFigureOut">
               <a:rPr lang="en-GB" smtClean="0"/>
-              <a:t>09/11/2018</a:t>
+              <a:t>19/11/2018</a:t>
             </a:fld>
             <a:endParaRPr lang="en-GB"/>
           </a:p>
@@ -1838,7 +1838,7 @@
           <a:p>
             <a:fld id="{B8F5C3C8-5F51-4191-BFCC-D40874AC55AA}" type="datetimeFigureOut">
               <a:rPr lang="en-GB" smtClean="0"/>
-              <a:t>09/11/2018</a:t>
+              <a:t>19/11/2018</a:t>
             </a:fld>
             <a:endParaRPr lang="en-GB"/>
           </a:p>
@@ -1980,7 +1980,7 @@
           <a:p>
             <a:fld id="{B8F5C3C8-5F51-4191-BFCC-D40874AC55AA}" type="datetimeFigureOut">
               <a:rPr lang="en-GB" smtClean="0"/>
-              <a:t>09/11/2018</a:t>
+              <a:t>19/11/2018</a:t>
             </a:fld>
             <a:endParaRPr lang="en-GB"/>
           </a:p>
@@ -2093,7 +2093,7 @@
           <a:p>
             <a:fld id="{B8F5C3C8-5F51-4191-BFCC-D40874AC55AA}" type="datetimeFigureOut">
               <a:rPr lang="en-GB" smtClean="0"/>
-              <a:t>09/11/2018</a:t>
+              <a:t>19/11/2018</a:t>
             </a:fld>
             <a:endParaRPr lang="en-GB"/>
           </a:p>
@@ -2406,7 +2406,7 @@
           <a:p>
             <a:fld id="{B8F5C3C8-5F51-4191-BFCC-D40874AC55AA}" type="datetimeFigureOut">
               <a:rPr lang="en-GB" smtClean="0"/>
-              <a:t>09/11/2018</a:t>
+              <a:t>19/11/2018</a:t>
             </a:fld>
             <a:endParaRPr lang="en-GB"/>
           </a:p>
@@ -2695,7 +2695,7 @@
           <a:p>
             <a:fld id="{B8F5C3C8-5F51-4191-BFCC-D40874AC55AA}" type="datetimeFigureOut">
               <a:rPr lang="en-GB" smtClean="0"/>
-              <a:t>09/11/2018</a:t>
+              <a:t>19/11/2018</a:t>
             </a:fld>
             <a:endParaRPr lang="en-GB"/>
           </a:p>
@@ -2943,7 +2943,7 @@
           <a:p>
             <a:fld id="{B8F5C3C8-5F51-4191-BFCC-D40874AC55AA}" type="datetimeFigureOut">
               <a:rPr lang="en-GB" smtClean="0"/>
-              <a:t>09/11/2018</a:t>
+              <a:t>19/11/2018</a:t>
             </a:fld>
             <a:endParaRPr lang="en-GB"/>
           </a:p>
@@ -7666,7 +7666,7 @@
                       <am3d:postTrans dx="0" dy="0" dz="0"/>
                     </am3d:trans>
                     <am3d:raster rName="Office3DRenderer" rVer="16.0.8326">
-                      <am3d:blip r:embed="rId4"/>
+                      <am3d:blip r:embed="rId3"/>
                     </am3d:raster>
                     <am3d:objViewport viewportSz="3576459"/>
                     <am3d:ambientLight>
@@ -9698,7 +9698,7 @@
                     <am3d:postTrans dx="0" dy="0" dz="0"/>
                   </am3d:trans>
                   <am3d:raster rName="Office3DRenderer" rVer="16.0.8326">
-                    <am3d:blip r:embed="rId13"/>
+                    <am3d:blip r:embed="rId12"/>
                   </am3d:raster>
                   <am3d:objViewport viewportSz="2247116"/>
                   <am3d:ambientLight>
@@ -10767,10 +10767,10 @@
       </p:grpSpPr>
       <p:pic>
         <p:nvPicPr>
-          <p:cNvPr id="5" name="Imagem 4">
+          <p:cNvPr id="4" name="Imagem 3">
             <a:extLst>
               <a:ext uri="{FF2B5EF4-FFF2-40B4-BE49-F238E27FC236}">
-                <a16:creationId xmlns:a16="http://schemas.microsoft.com/office/drawing/2014/main" id="{0771AF17-4C9F-4230-8F9A-1CE42ECB9DA8}"/>
+                <a16:creationId xmlns:a16="http://schemas.microsoft.com/office/drawing/2014/main" id="{45C1DCD2-216E-40F6-B9D6-64180D38A53D}"/>
               </a:ext>
             </a:extLst>
           </p:cNvPr>
@@ -10787,8 +10787,8 @@
         </p:blipFill>
         <p:spPr>
           <a:xfrm>
-            <a:off x="-722700" y="-107750"/>
-            <a:ext cx="13637401" cy="7073501"/>
+            <a:off x="140604" y="-180975"/>
+            <a:ext cx="11910793" cy="7460010"/>
           </a:xfrm>
           <a:prstGeom prst="rect">
             <a:avLst/>

</xml_diff>